<commit_message>
Results from ranking decisions and computing rewards
</commit_message>
<xml_diff>
--- a/results/ranking/Summary_FullTrace.pptx
+++ b/results/ranking/Summary_FullTrace.pptx
@@ -109,7 +109,16 @@
       </a:defRPr>
     </a:lvl9pPr>
   </p:defaultTextStyle>
+  <p:extLst>
+    <p:ext uri="{EFAFB233-063F-42B5-8137-9DF3F51BA10A}">
+      <p15:sldGuideLst xmlns:p15="http://schemas.microsoft.com/office/powerpoint/2012/main"/>
+    </p:ext>
+  </p:extLst>
 </p:presentation>
+</file>
+
+<file path=ppt/revisionInfo.xml><?xml version="1.0" encoding="utf-8"?>
+<p1510:revInfo xmlns:a="http://schemas.openxmlformats.org/drawingml/2006/main" xmlns:r="http://schemas.openxmlformats.org/officeDocument/2006/relationships" xmlns:p1510="http://schemas.microsoft.com/office/powerpoint/2015/10/main"/>
 </file>
 
 <file path=ppt/slideLayouts/slideLayout1.xml><?xml version="1.0" encoding="utf-8"?>
@@ -259,7 +268,7 @@
           <a:p>
             <a:fld id="{9427237E-80E0-45F0-94F2-62B4422BE55E}" type="datetimeFigureOut">
               <a:rPr lang="en-US" smtClean="0"/>
-              <a:t>1/24/2018</a:t>
+              <a:t>2/1/2018</a:t>
             </a:fld>
             <a:endParaRPr lang="en-US"/>
           </a:p>
@@ -457,7 +466,7 @@
           <a:p>
             <a:fld id="{9427237E-80E0-45F0-94F2-62B4422BE55E}" type="datetimeFigureOut">
               <a:rPr lang="en-US" smtClean="0"/>
-              <a:t>1/24/2018</a:t>
+              <a:t>2/1/2018</a:t>
             </a:fld>
             <a:endParaRPr lang="en-US"/>
           </a:p>
@@ -665,7 +674,7 @@
           <a:p>
             <a:fld id="{9427237E-80E0-45F0-94F2-62B4422BE55E}" type="datetimeFigureOut">
               <a:rPr lang="en-US" smtClean="0"/>
-              <a:t>1/24/2018</a:t>
+              <a:t>2/1/2018</a:t>
             </a:fld>
             <a:endParaRPr lang="en-US"/>
           </a:p>
@@ -863,7 +872,7 @@
           <a:p>
             <a:fld id="{9427237E-80E0-45F0-94F2-62B4422BE55E}" type="datetimeFigureOut">
               <a:rPr lang="en-US" smtClean="0"/>
-              <a:t>1/24/2018</a:t>
+              <a:t>2/1/2018</a:t>
             </a:fld>
             <a:endParaRPr lang="en-US"/>
           </a:p>
@@ -1138,7 +1147,7 @@
           <a:p>
             <a:fld id="{9427237E-80E0-45F0-94F2-62B4422BE55E}" type="datetimeFigureOut">
               <a:rPr lang="en-US" smtClean="0"/>
-              <a:t>1/24/2018</a:t>
+              <a:t>2/1/2018</a:t>
             </a:fld>
             <a:endParaRPr lang="en-US"/>
           </a:p>
@@ -1403,7 +1412,7 @@
           <a:p>
             <a:fld id="{9427237E-80E0-45F0-94F2-62B4422BE55E}" type="datetimeFigureOut">
               <a:rPr lang="en-US" smtClean="0"/>
-              <a:t>1/24/2018</a:t>
+              <a:t>2/1/2018</a:t>
             </a:fld>
             <a:endParaRPr lang="en-US"/>
           </a:p>
@@ -1815,7 +1824,7 @@
           <a:p>
             <a:fld id="{9427237E-80E0-45F0-94F2-62B4422BE55E}" type="datetimeFigureOut">
               <a:rPr lang="en-US" smtClean="0"/>
-              <a:t>1/24/2018</a:t>
+              <a:t>2/1/2018</a:t>
             </a:fld>
             <a:endParaRPr lang="en-US"/>
           </a:p>
@@ -1956,7 +1965,7 @@
           <a:p>
             <a:fld id="{9427237E-80E0-45F0-94F2-62B4422BE55E}" type="datetimeFigureOut">
               <a:rPr lang="en-US" smtClean="0"/>
-              <a:t>1/24/2018</a:t>
+              <a:t>2/1/2018</a:t>
             </a:fld>
             <a:endParaRPr lang="en-US"/>
           </a:p>
@@ -2069,7 +2078,7 @@
           <a:p>
             <a:fld id="{9427237E-80E0-45F0-94F2-62B4422BE55E}" type="datetimeFigureOut">
               <a:rPr lang="en-US" smtClean="0"/>
-              <a:t>1/24/2018</a:t>
+              <a:t>2/1/2018</a:t>
             </a:fld>
             <a:endParaRPr lang="en-US"/>
           </a:p>
@@ -2380,7 +2389,7 @@
           <a:p>
             <a:fld id="{9427237E-80E0-45F0-94F2-62B4422BE55E}" type="datetimeFigureOut">
               <a:rPr lang="en-US" smtClean="0"/>
-              <a:t>1/24/2018</a:t>
+              <a:t>2/1/2018</a:t>
             </a:fld>
             <a:endParaRPr lang="en-US"/>
           </a:p>
@@ -2668,7 +2677,7 @@
           <a:p>
             <a:fld id="{9427237E-80E0-45F0-94F2-62B4422BE55E}" type="datetimeFigureOut">
               <a:rPr lang="en-US" smtClean="0"/>
-              <a:t>1/24/2018</a:t>
+              <a:t>2/1/2018</a:t>
             </a:fld>
             <a:endParaRPr lang="en-US"/>
           </a:p>
@@ -2909,7 +2918,7 @@
           <a:p>
             <a:fld id="{9427237E-80E0-45F0-94F2-62B4422BE55E}" type="datetimeFigureOut">
               <a:rPr lang="en-US" smtClean="0"/>
-              <a:t>1/24/2018</a:t>
+              <a:t>2/1/2018</a:t>
             </a:fld>
             <a:endParaRPr lang="en-US"/>
           </a:p>
@@ -3424,7 +3433,7 @@
           <p:nvPr/>
         </p:nvPicPr>
         <p:blipFill>
-          <a:blip r:embed="rId3"/>
+          <a:blip r:embed="rId2"/>
           <a:stretch>
             <a:fillRect/>
           </a:stretch>
@@ -3454,7 +3463,7 @@
           <p:nvPr/>
         </p:nvPicPr>
         <p:blipFill>
-          <a:blip r:embed="rId4"/>
+          <a:blip r:embed="rId3"/>
           <a:stretch>
             <a:fillRect/>
           </a:stretch>
@@ -3484,7 +3493,7 @@
           <p:nvPr/>
         </p:nvPicPr>
         <p:blipFill>
-          <a:blip r:embed="rId5"/>
+          <a:blip r:embed="rId4"/>
           <a:stretch>
             <a:fillRect/>
           </a:stretch>
@@ -3544,14 +3553,14 @@
           <p:nvPr/>
         </p:nvPicPr>
         <p:blipFill>
-          <a:blip r:embed="rId3"/>
+          <a:blip r:embed="rId2"/>
           <a:stretch>
             <a:fillRect/>
           </a:stretch>
         </p:blipFill>
         <p:spPr>
           <a:xfrm>
-            <a:off x="0" y="390929"/>
+            <a:off x="0" y="343162"/>
             <a:ext cx="12192000" cy="1866361"/>
           </a:xfrm>
           <a:prstGeom prst="rect">
@@ -3574,7 +3583,7 @@
           <p:nvPr/>
         </p:nvPicPr>
         <p:blipFill>
-          <a:blip r:embed="rId4"/>
+          <a:blip r:embed="rId3"/>
           <a:stretch>
             <a:fillRect/>
           </a:stretch>
@@ -3604,7 +3613,7 @@
           <p:nvPr/>
         </p:nvPicPr>
         <p:blipFill>
-          <a:blip r:embed="rId5"/>
+          <a:blip r:embed="rId4"/>
           <a:stretch>
             <a:fillRect/>
           </a:stretch>
@@ -3613,36 +3622,6 @@
           <a:xfrm>
             <a:off x="0" y="4467672"/>
             <a:ext cx="12192000" cy="1866361"/>
-          </a:xfrm>
-          <a:prstGeom prst="rect">
-            <a:avLst/>
-          </a:prstGeom>
-        </p:spPr>
-      </p:pic>
-      <p:pic>
-        <p:nvPicPr>
-          <p:cNvPr id="27" name="Picture 26">
-            <a:extLst>
-              <a:ext uri="{FF2B5EF4-FFF2-40B4-BE49-F238E27FC236}">
-                <a16:creationId xmlns:a16="http://schemas.microsoft.com/office/drawing/2014/main" id="{FFE43A9D-BC98-452A-85A8-2A6A378468B0}"/>
-              </a:ext>
-            </a:extLst>
-          </p:cNvPr>
-          <p:cNvPicPr>
-            <a:picLocks noChangeAspect="1"/>
-          </p:cNvPicPr>
-          <p:nvPr/>
-        </p:nvPicPr>
-        <p:blipFill>
-          <a:blip r:embed="rId6"/>
-          <a:stretch>
-            <a:fillRect/>
-          </a:stretch>
-        </p:blipFill>
-        <p:spPr>
-          <a:xfrm>
-            <a:off x="2183518" y="1685546"/>
-            <a:ext cx="898648" cy="235708"/>
           </a:xfrm>
           <a:prstGeom prst="rect">
             <a:avLst/>

</xml_diff>